<commit_message>
all dashboard completed with charts and leaflet
</commit_message>
<xml_diff>
--- a/Presentation.pptx
+++ b/Presentation.pptx
@@ -11,8 +11,11 @@
     <p:sldId id="259" r:id="rId5"/>
     <p:sldId id="260" r:id="rId6"/>
     <p:sldId id="261" r:id="rId7"/>
-    <p:sldId id="262" r:id="rId8"/>
-    <p:sldId id="263" r:id="rId9"/>
+    <p:sldId id="263" r:id="rId8"/>
+    <p:sldId id="264" r:id="rId9"/>
+    <p:sldId id="266" r:id="rId10"/>
+    <p:sldId id="265" r:id="rId11"/>
+    <p:sldId id="262" r:id="rId12"/>
   </p:sldIdLst>
   <p:sldSz cx="12192000" cy="6858000"/>
   <p:notesSz cx="6858000" cy="9144000"/>
@@ -720,6 +723,11 @@
               </a:ln>
               <a:effectLst/>
             </c:spPr>
+            <c:extLst>
+              <c:ext xmlns:c16="http://schemas.microsoft.com/office/drawing/2014/chart" uri="{C3380CC4-5D6E-409C-BE32-E72D297353CC}">
+                <c16:uniqueId val="{00000001-591C-46D1-8755-F798CBDE47D9}"/>
+              </c:ext>
+            </c:extLst>
           </c:dPt>
           <c:dPt>
             <c:idx val="1"/>
@@ -735,6 +743,11 @@
               </a:ln>
               <a:effectLst/>
             </c:spPr>
+            <c:extLst>
+              <c:ext xmlns:c16="http://schemas.microsoft.com/office/drawing/2014/chart" uri="{C3380CC4-5D6E-409C-BE32-E72D297353CC}">
+                <c16:uniqueId val="{00000003-591C-46D1-8755-F798CBDE47D9}"/>
+              </c:ext>
+            </c:extLst>
           </c:dPt>
           <c:dPt>
             <c:idx val="2"/>
@@ -750,6 +763,11 @@
               </a:ln>
               <a:effectLst/>
             </c:spPr>
+            <c:extLst>
+              <c:ext xmlns:c16="http://schemas.microsoft.com/office/drawing/2014/chart" uri="{C3380CC4-5D6E-409C-BE32-E72D297353CC}">
+                <c16:uniqueId val="{00000005-591C-46D1-8755-F798CBDE47D9}"/>
+              </c:ext>
+            </c:extLst>
           </c:dPt>
           <c:dPt>
             <c:idx val="3"/>
@@ -765,6 +783,11 @@
               </a:ln>
               <a:effectLst/>
             </c:spPr>
+            <c:extLst>
+              <c:ext xmlns:c16="http://schemas.microsoft.com/office/drawing/2014/chart" uri="{C3380CC4-5D6E-409C-BE32-E72D297353CC}">
+                <c16:uniqueId val="{00000007-591C-46D1-8755-F798CBDE47D9}"/>
+              </c:ext>
+            </c:extLst>
           </c:dPt>
           <c:cat>
             <c:strRef>
@@ -5275,7 +5298,7 @@
           <a:p>
             <a:fld id="{AEA2526E-3715-4C5E-A2BD-7F057FCA1EE9}" type="datetimeFigureOut">
               <a:rPr lang="en-AU" smtClean="0"/>
-              <a:t>7/11/2023</a:t>
+              <a:t>11/11/2023</a:t>
             </a:fld>
             <a:endParaRPr lang="en-AU"/>
           </a:p>
@@ -5475,7 +5498,7 @@
           <a:p>
             <a:fld id="{AEA2526E-3715-4C5E-A2BD-7F057FCA1EE9}" type="datetimeFigureOut">
               <a:rPr lang="en-AU" smtClean="0"/>
-              <a:t>7/11/2023</a:t>
+              <a:t>11/11/2023</a:t>
             </a:fld>
             <a:endParaRPr lang="en-AU"/>
           </a:p>
@@ -5685,7 +5708,7 @@
           <a:p>
             <a:fld id="{AEA2526E-3715-4C5E-A2BD-7F057FCA1EE9}" type="datetimeFigureOut">
               <a:rPr lang="en-AU" smtClean="0"/>
-              <a:t>7/11/2023</a:t>
+              <a:t>11/11/2023</a:t>
             </a:fld>
             <a:endParaRPr lang="en-AU"/>
           </a:p>
@@ -5885,7 +5908,7 @@
           <a:p>
             <a:fld id="{AEA2526E-3715-4C5E-A2BD-7F057FCA1EE9}" type="datetimeFigureOut">
               <a:rPr lang="en-AU" smtClean="0"/>
-              <a:t>7/11/2023</a:t>
+              <a:t>11/11/2023</a:t>
             </a:fld>
             <a:endParaRPr lang="en-AU"/>
           </a:p>
@@ -6161,7 +6184,7 @@
           <a:p>
             <a:fld id="{AEA2526E-3715-4C5E-A2BD-7F057FCA1EE9}" type="datetimeFigureOut">
               <a:rPr lang="en-AU" smtClean="0"/>
-              <a:t>7/11/2023</a:t>
+              <a:t>11/11/2023</a:t>
             </a:fld>
             <a:endParaRPr lang="en-AU"/>
           </a:p>
@@ -6429,7 +6452,7 @@
           <a:p>
             <a:fld id="{AEA2526E-3715-4C5E-A2BD-7F057FCA1EE9}" type="datetimeFigureOut">
               <a:rPr lang="en-AU" smtClean="0"/>
-              <a:t>7/11/2023</a:t>
+              <a:t>11/11/2023</a:t>
             </a:fld>
             <a:endParaRPr lang="en-AU"/>
           </a:p>
@@ -6844,7 +6867,7 @@
           <a:p>
             <a:fld id="{AEA2526E-3715-4C5E-A2BD-7F057FCA1EE9}" type="datetimeFigureOut">
               <a:rPr lang="en-AU" smtClean="0"/>
-              <a:t>7/11/2023</a:t>
+              <a:t>11/11/2023</a:t>
             </a:fld>
             <a:endParaRPr lang="en-AU"/>
           </a:p>
@@ -6986,7 +7009,7 @@
           <a:p>
             <a:fld id="{AEA2526E-3715-4C5E-A2BD-7F057FCA1EE9}" type="datetimeFigureOut">
               <a:rPr lang="en-AU" smtClean="0"/>
-              <a:t>7/11/2023</a:t>
+              <a:t>11/11/2023</a:t>
             </a:fld>
             <a:endParaRPr lang="en-AU"/>
           </a:p>
@@ -7099,7 +7122,7 @@
           <a:p>
             <a:fld id="{AEA2526E-3715-4C5E-A2BD-7F057FCA1EE9}" type="datetimeFigureOut">
               <a:rPr lang="en-AU" smtClean="0"/>
-              <a:t>7/11/2023</a:t>
+              <a:t>11/11/2023</a:t>
             </a:fld>
             <a:endParaRPr lang="en-AU"/>
           </a:p>
@@ -7412,7 +7435,7 @@
           <a:p>
             <a:fld id="{AEA2526E-3715-4C5E-A2BD-7F057FCA1EE9}" type="datetimeFigureOut">
               <a:rPr lang="en-AU" smtClean="0"/>
-              <a:t>7/11/2023</a:t>
+              <a:t>11/11/2023</a:t>
             </a:fld>
             <a:endParaRPr lang="en-AU"/>
           </a:p>
@@ -7701,7 +7724,7 @@
           <a:p>
             <a:fld id="{AEA2526E-3715-4C5E-A2BD-7F057FCA1EE9}" type="datetimeFigureOut">
               <a:rPr lang="en-AU" smtClean="0"/>
-              <a:t>7/11/2023</a:t>
+              <a:t>11/11/2023</a:t>
             </a:fld>
             <a:endParaRPr lang="en-AU"/>
           </a:p>
@@ -7944,7 +7967,7 @@
           <a:p>
             <a:fld id="{AEA2526E-3715-4C5E-A2BD-7F057FCA1EE9}" type="datetimeFigureOut">
               <a:rPr lang="en-AU" smtClean="0"/>
-              <a:t>7/11/2023</a:t>
+              <a:t>11/11/2023</a:t>
             </a:fld>
             <a:endParaRPr lang="en-AU"/>
           </a:p>
@@ -8441,6 +8464,435 @@
 </p:sld>
 </file>
 
+<file path=ppt/slides/slide10.xml><?xml version="1.0" encoding="utf-8"?>
+<p:sld xmlns:a="http://schemas.openxmlformats.org/drawingml/2006/main" xmlns:r="http://schemas.openxmlformats.org/officeDocument/2006/relationships" xmlns:p="http://schemas.openxmlformats.org/presentationml/2006/main">
+  <p:cSld>
+    <p:spTree>
+      <p:nvGrpSpPr>
+        <p:cNvPr id="1" name=""/>
+        <p:cNvGrpSpPr/>
+        <p:nvPr/>
+      </p:nvGrpSpPr>
+      <p:grpSpPr>
+        <a:xfrm>
+          <a:off x="0" y="0"/>
+          <a:ext cx="0" cy="0"/>
+          <a:chOff x="0" y="0"/>
+          <a:chExt cx="0" cy="0"/>
+        </a:xfrm>
+      </p:grpSpPr>
+      <p:sp>
+        <p:nvSpPr>
+          <p:cNvPr id="5" name="TextBox 4">
+            <a:extLst>
+              <a:ext uri="{FF2B5EF4-FFF2-40B4-BE49-F238E27FC236}">
+                <a16:creationId xmlns:a16="http://schemas.microsoft.com/office/drawing/2014/main" id="{55BD48A7-CFB7-9B78-2DB8-3497501CAADF}"/>
+              </a:ext>
+            </a:extLst>
+          </p:cNvPr>
+          <p:cNvSpPr txBox="1"/>
+          <p:nvPr/>
+        </p:nvSpPr>
+        <p:spPr>
+          <a:xfrm>
+            <a:off x="445536" y="55783"/>
+            <a:ext cx="10984463" cy="1200329"/>
+          </a:xfrm>
+          <a:prstGeom prst="rect">
+            <a:avLst/>
+          </a:prstGeom>
+          <a:noFill/>
+        </p:spPr>
+        <p:txBody>
+          <a:bodyPr wrap="square">
+            <a:spAutoFit/>
+          </a:bodyPr>
+          <a:lstStyle/>
+          <a:p>
+            <a:r>
+              <a:rPr lang="en-AU" dirty="0"/>
+              <a:t> </a:t>
+            </a:r>
+          </a:p>
+          <a:p>
+            <a:r>
+              <a:rPr lang="en-AU" b="1" dirty="0"/>
+              <a:t>In our logic.js we provided functions to handle 2 main events: </a:t>
+            </a:r>
+          </a:p>
+          <a:p>
+            <a:r>
+              <a:rPr lang="en-AU" dirty="0"/>
+              <a:t>- Scrolling down with the Div continuing to show as you scroll down the page </a:t>
+            </a:r>
+          </a:p>
+          <a:p>
+            <a:r>
+              <a:rPr lang="en-AU" dirty="0"/>
+              <a:t>- Dropdown box for year selection: </a:t>
+            </a:r>
+          </a:p>
+        </p:txBody>
+      </p:sp>
+      <p:pic>
+        <p:nvPicPr>
+          <p:cNvPr id="7" name="Picture 6">
+            <a:extLst>
+              <a:ext uri="{FF2B5EF4-FFF2-40B4-BE49-F238E27FC236}">
+                <a16:creationId xmlns:a16="http://schemas.microsoft.com/office/drawing/2014/main" id="{211BF87F-6959-4F0C-4054-F697F1C75C26}"/>
+              </a:ext>
+            </a:extLst>
+          </p:cNvPr>
+          <p:cNvPicPr>
+            <a:picLocks noChangeAspect="1"/>
+          </p:cNvPicPr>
+          <p:nvPr/>
+        </p:nvPicPr>
+        <p:blipFill rotWithShape="1">
+          <a:blip r:embed="rId2"/>
+          <a:srcRect l="23648" t="3878" r="52628" b="43369"/>
+          <a:stretch/>
+        </p:blipFill>
+        <p:spPr>
+          <a:xfrm>
+            <a:off x="259437" y="1679509"/>
+            <a:ext cx="7668736" cy="4795936"/>
+          </a:xfrm>
+          <a:prstGeom prst="rect">
+            <a:avLst/>
+          </a:prstGeom>
+        </p:spPr>
+      </p:pic>
+      <p:sp>
+        <p:nvSpPr>
+          <p:cNvPr id="8" name="TextBox 7">
+            <a:extLst>
+              <a:ext uri="{FF2B5EF4-FFF2-40B4-BE49-F238E27FC236}">
+                <a16:creationId xmlns:a16="http://schemas.microsoft.com/office/drawing/2014/main" id="{C8644FF9-B562-DE05-8573-B164DA6F47C0}"/>
+              </a:ext>
+            </a:extLst>
+          </p:cNvPr>
+          <p:cNvSpPr txBox="1"/>
+          <p:nvPr/>
+        </p:nvSpPr>
+        <p:spPr>
+          <a:xfrm>
+            <a:off x="8190988" y="923530"/>
+            <a:ext cx="3676261" cy="4247317"/>
+          </a:xfrm>
+          <a:prstGeom prst="rect">
+            <a:avLst/>
+          </a:prstGeom>
+          <a:noFill/>
+        </p:spPr>
+        <p:txBody>
+          <a:bodyPr wrap="square" rtlCol="0">
+            <a:spAutoFit/>
+          </a:bodyPr>
+          <a:lstStyle/>
+          <a:p>
+            <a:r>
+              <a:rPr lang="en-AU" dirty="0"/>
+              <a:t>There were 7 Functions for making each graph/table : </a:t>
+            </a:r>
+          </a:p>
+          <a:p>
+            <a:endParaRPr lang="en-AU" dirty="0"/>
+          </a:p>
+          <a:p>
+            <a:r>
+              <a:rPr lang="en-AU" b="1" dirty="0"/>
+              <a:t>Changing with year selection </a:t>
+            </a:r>
+          </a:p>
+          <a:p>
+            <a:pPr marL="285750" indent="-285750">
+              <a:buFont typeface="Arial" panose="020B0604020202020204" pitchFamily="34" charset="0"/>
+              <a:buChar char="•"/>
+            </a:pPr>
+            <a:r>
+              <a:rPr lang="en-AU" dirty="0"/>
+              <a:t> </a:t>
+            </a:r>
+            <a:r>
+              <a:rPr lang="en-AU" dirty="0" err="1"/>
+              <a:t>updateRoadUserChart</a:t>
+            </a:r>
+            <a:endParaRPr lang="en-AU" dirty="0"/>
+          </a:p>
+          <a:p>
+            <a:pPr marL="285750" indent="-285750">
+              <a:buFont typeface="Arial" panose="020B0604020202020204" pitchFamily="34" charset="0"/>
+              <a:buChar char="•"/>
+            </a:pPr>
+            <a:r>
+              <a:rPr lang="en-AU" dirty="0" err="1"/>
+              <a:t>updateFatalitiesChart</a:t>
+            </a:r>
+            <a:endParaRPr lang="en-AU" dirty="0"/>
+          </a:p>
+          <a:p>
+            <a:pPr marL="285750" indent="-285750">
+              <a:buFont typeface="Arial" panose="020B0604020202020204" pitchFamily="34" charset="0"/>
+              <a:buChar char="•"/>
+            </a:pPr>
+            <a:r>
+              <a:rPr lang="en-AU" dirty="0" err="1"/>
+              <a:t>updateStateChart</a:t>
+            </a:r>
+            <a:endParaRPr lang="en-AU" dirty="0"/>
+          </a:p>
+          <a:p>
+            <a:pPr marL="285750" indent="-285750">
+              <a:buFont typeface="Arial" panose="020B0604020202020204" pitchFamily="34" charset="0"/>
+              <a:buChar char="•"/>
+            </a:pPr>
+            <a:r>
+              <a:rPr lang="en-AU" dirty="0" err="1"/>
+              <a:t>updateAgeGroupChart</a:t>
+            </a:r>
+            <a:endParaRPr lang="en-AU" dirty="0"/>
+          </a:p>
+          <a:p>
+            <a:pPr marL="285750" indent="-285750">
+              <a:buFont typeface="Arial" panose="020B0604020202020204" pitchFamily="34" charset="0"/>
+              <a:buChar char="•"/>
+            </a:pPr>
+            <a:r>
+              <a:rPr lang="en-AU" dirty="0" err="1"/>
+              <a:t>updateGenderChart</a:t>
+            </a:r>
+            <a:r>
+              <a:rPr lang="en-AU" dirty="0"/>
+              <a:t> </a:t>
+            </a:r>
+          </a:p>
+          <a:p>
+            <a:pPr marL="285750" indent="-285750">
+              <a:buFont typeface="Arial" panose="020B0604020202020204" pitchFamily="34" charset="0"/>
+              <a:buChar char="•"/>
+            </a:pPr>
+            <a:endParaRPr lang="en-AU" dirty="0"/>
+          </a:p>
+          <a:p>
+            <a:r>
+              <a:rPr lang="en-AU" b="1" dirty="0"/>
+              <a:t>Static/stagnant Charts/tables </a:t>
+            </a:r>
+          </a:p>
+          <a:p>
+            <a:pPr marL="285750" indent="-285750">
+              <a:buFont typeface="Arial" panose="020B0604020202020204" pitchFamily="34" charset="0"/>
+              <a:buChar char="•"/>
+            </a:pPr>
+            <a:r>
+              <a:rPr lang="en-AU" dirty="0" err="1"/>
+              <a:t>summaryTable</a:t>
+            </a:r>
+            <a:r>
+              <a:rPr lang="en-AU" dirty="0"/>
+              <a:t> </a:t>
+            </a:r>
+          </a:p>
+          <a:p>
+            <a:pPr marL="285750" indent="-285750">
+              <a:buFont typeface="Arial" panose="020B0604020202020204" pitchFamily="34" charset="0"/>
+              <a:buChar char="•"/>
+            </a:pPr>
+            <a:r>
+              <a:rPr lang="en-AU" dirty="0" err="1"/>
+              <a:t>updateStateYearChart</a:t>
+            </a:r>
+            <a:r>
+              <a:rPr lang="en-AU" dirty="0"/>
+              <a:t> </a:t>
+            </a:r>
+          </a:p>
+          <a:p>
+            <a:endParaRPr lang="en-AU" dirty="0"/>
+          </a:p>
+          <a:p>
+            <a:endParaRPr lang="en-AU" dirty="0"/>
+          </a:p>
+        </p:txBody>
+      </p:sp>
+    </p:spTree>
+    <p:extLst>
+      <p:ext uri="{BB962C8B-B14F-4D97-AF65-F5344CB8AC3E}">
+        <p14:creationId xmlns:p14="http://schemas.microsoft.com/office/powerpoint/2010/main" val="3252462435"/>
+      </p:ext>
+    </p:extLst>
+  </p:cSld>
+  <p:clrMapOvr>
+    <a:masterClrMapping/>
+  </p:clrMapOvr>
+</p:sld>
+</file>
+
+<file path=ppt/slides/slide11.xml><?xml version="1.0" encoding="utf-8"?>
+<p:sld xmlns:a="http://schemas.openxmlformats.org/drawingml/2006/main" xmlns:r="http://schemas.openxmlformats.org/officeDocument/2006/relationships" xmlns:p="http://schemas.openxmlformats.org/presentationml/2006/main">
+  <p:cSld>
+    <p:spTree>
+      <p:nvGrpSpPr>
+        <p:cNvPr id="1" name=""/>
+        <p:cNvGrpSpPr/>
+        <p:nvPr/>
+      </p:nvGrpSpPr>
+      <p:grpSpPr>
+        <a:xfrm>
+          <a:off x="0" y="0"/>
+          <a:ext cx="0" cy="0"/>
+          <a:chOff x="0" y="0"/>
+          <a:chExt cx="0" cy="0"/>
+        </a:xfrm>
+      </p:grpSpPr>
+      <p:sp>
+        <p:nvSpPr>
+          <p:cNvPr id="2" name="Title 1">
+            <a:extLst>
+              <a:ext uri="{FF2B5EF4-FFF2-40B4-BE49-F238E27FC236}">
+                <a16:creationId xmlns:a16="http://schemas.microsoft.com/office/drawing/2014/main" id="{A763C668-C828-7BEB-0A5D-80FD652A0BA2}"/>
+              </a:ext>
+            </a:extLst>
+          </p:cNvPr>
+          <p:cNvSpPr>
+            <a:spLocks noGrp="1"/>
+          </p:cNvSpPr>
+          <p:nvPr>
+            <p:ph type="title"/>
+          </p:nvPr>
+        </p:nvSpPr>
+        <p:spPr/>
+        <p:txBody>
+          <a:bodyPr/>
+          <a:lstStyle/>
+          <a:p>
+            <a:r>
+              <a:rPr lang="en-AU" dirty="0"/>
+              <a:t>References </a:t>
+            </a:r>
+          </a:p>
+        </p:txBody>
+      </p:sp>
+      <p:sp>
+        <p:nvSpPr>
+          <p:cNvPr id="3" name="Content Placeholder 2">
+            <a:extLst>
+              <a:ext uri="{FF2B5EF4-FFF2-40B4-BE49-F238E27FC236}">
+                <a16:creationId xmlns:a16="http://schemas.microsoft.com/office/drawing/2014/main" id="{BC240E26-E4E1-2F27-5938-3893BE589858}"/>
+              </a:ext>
+            </a:extLst>
+          </p:cNvPr>
+          <p:cNvSpPr>
+            <a:spLocks noGrp="1"/>
+          </p:cNvSpPr>
+          <p:nvPr>
+            <p:ph idx="1"/>
+          </p:nvPr>
+        </p:nvSpPr>
+        <p:spPr/>
+        <p:txBody>
+          <a:bodyPr/>
+          <a:lstStyle/>
+          <a:p>
+            <a:endParaRPr lang="en-AU" dirty="0"/>
+          </a:p>
+          <a:p>
+            <a:r>
+              <a:rPr lang="en-US" dirty="0">
+                <a:hlinkClick r:id="rId2"/>
+              </a:rPr>
+              <a:t>Green Color Codes (html-</a:t>
+            </a:r>
+            <a:r>
+              <a:rPr lang="en-US" dirty="0" err="1">
+                <a:hlinkClick r:id="rId2"/>
+              </a:rPr>
+              <a:t>color.codes</a:t>
+            </a:r>
+            <a:r>
+              <a:rPr lang="en-US" dirty="0">
+                <a:hlinkClick r:id="rId2"/>
+              </a:rPr>
+              <a:t>)</a:t>
+            </a:r>
+            <a:r>
+              <a:rPr lang="en-AU" dirty="0"/>
+              <a:t>  </a:t>
+            </a:r>
+          </a:p>
+          <a:p>
+            <a:r>
+              <a:rPr lang="en-US" dirty="0">
+                <a:hlinkClick r:id="rId3"/>
+              </a:rPr>
+              <a:t>How to Highlight Table Row on hover mouse Using CSS (tutorialdeep.com)</a:t>
+            </a:r>
+            <a:r>
+              <a:rPr lang="en-AU" dirty="0"/>
+              <a:t>	</a:t>
+            </a:r>
+          </a:p>
+          <a:p>
+            <a:r>
+              <a:rPr lang="en-AU" dirty="0">
+                <a:hlinkClick r:id="rId4"/>
+              </a:rPr>
+              <a:t>CSS Table Style (w3schools.com)</a:t>
+            </a:r>
+            <a:endParaRPr lang="en-AU" dirty="0"/>
+          </a:p>
+          <a:p>
+            <a:r>
+              <a:rPr lang="en-US" dirty="0">
+                <a:hlinkClick r:id="rId5"/>
+              </a:rPr>
+              <a:t>Canvas is already in use. Chart with ID '3' must be destroyed before the canvas with ID '</a:t>
+            </a:r>
+            <a:r>
+              <a:rPr lang="en-US" dirty="0" err="1">
+                <a:hlinkClick r:id="rId5"/>
+              </a:rPr>
+              <a:t>eachStateChart</a:t>
+            </a:r>
+            <a:r>
+              <a:rPr lang="en-US" dirty="0">
+                <a:hlinkClick r:id="rId5"/>
+              </a:rPr>
+              <a:t>' can be reused - Search (bing.com)</a:t>
+            </a:r>
+            <a:endParaRPr lang="en-US" dirty="0"/>
+          </a:p>
+          <a:p>
+            <a:r>
+              <a:rPr lang="en-US" dirty="0">
+                <a:hlinkClick r:id="rId6"/>
+              </a:rPr>
+              <a:t>How To Create an On Scroll Fixed Header (w3schools.com)</a:t>
+            </a:r>
+            <a:endParaRPr lang="en-US" dirty="0"/>
+          </a:p>
+          <a:p>
+            <a:endParaRPr lang="en-US" dirty="0"/>
+          </a:p>
+          <a:p>
+            <a:endParaRPr lang="en-AU" dirty="0"/>
+          </a:p>
+        </p:txBody>
+      </p:sp>
+    </p:spTree>
+    <p:extLst>
+      <p:ext uri="{BB962C8B-B14F-4D97-AF65-F5344CB8AC3E}">
+        <p14:creationId xmlns:p14="http://schemas.microsoft.com/office/powerpoint/2010/main" val="3079897019"/>
+      </p:ext>
+    </p:extLst>
+  </p:cSld>
+  <p:clrMapOvr>
+    <a:masterClrMapping/>
+  </p:clrMapOvr>
+</p:sld>
+</file>
+
 <file path=ppt/slides/slide2.xml><?xml version="1.0" encoding="utf-8"?>
 <p:sld xmlns:a="http://schemas.openxmlformats.org/drawingml/2006/main" xmlns:r="http://schemas.openxmlformats.org/officeDocument/2006/relationships" xmlns:p="http://schemas.openxmlformats.org/presentationml/2006/main">
   <p:cSld>
@@ -9224,89 +9676,6 @@
 </file>
 
 <file path=ppt/slides/slide7.xml><?xml version="1.0" encoding="utf-8"?>
-<p:sld xmlns:a="http://schemas.openxmlformats.org/drawingml/2006/main" xmlns:r="http://schemas.openxmlformats.org/officeDocument/2006/relationships" xmlns:p="http://schemas.openxmlformats.org/presentationml/2006/main">
-  <p:cSld>
-    <p:spTree>
-      <p:nvGrpSpPr>
-        <p:cNvPr id="1" name=""/>
-        <p:cNvGrpSpPr/>
-        <p:nvPr/>
-      </p:nvGrpSpPr>
-      <p:grpSpPr>
-        <a:xfrm>
-          <a:off x="0" y="0"/>
-          <a:ext cx="0" cy="0"/>
-          <a:chOff x="0" y="0"/>
-          <a:chExt cx="0" cy="0"/>
-        </a:xfrm>
-      </p:grpSpPr>
-      <p:sp>
-        <p:nvSpPr>
-          <p:cNvPr id="2" name="Title 1">
-            <a:extLst>
-              <a:ext uri="{FF2B5EF4-FFF2-40B4-BE49-F238E27FC236}">
-                <a16:creationId xmlns:a16="http://schemas.microsoft.com/office/drawing/2014/main" id="{A763C668-C828-7BEB-0A5D-80FD652A0BA2}"/>
-              </a:ext>
-            </a:extLst>
-          </p:cNvPr>
-          <p:cNvSpPr>
-            <a:spLocks noGrp="1"/>
-          </p:cNvSpPr>
-          <p:nvPr>
-            <p:ph type="title"/>
-          </p:nvPr>
-        </p:nvSpPr>
-        <p:spPr/>
-        <p:txBody>
-          <a:bodyPr/>
-          <a:lstStyle/>
-          <a:p>
-            <a:endParaRPr lang="en-AU" dirty="0"/>
-          </a:p>
-        </p:txBody>
-      </p:sp>
-      <p:sp>
-        <p:nvSpPr>
-          <p:cNvPr id="3" name="Content Placeholder 2">
-            <a:extLst>
-              <a:ext uri="{FF2B5EF4-FFF2-40B4-BE49-F238E27FC236}">
-                <a16:creationId xmlns:a16="http://schemas.microsoft.com/office/drawing/2014/main" id="{BC240E26-E4E1-2F27-5938-3893BE589858}"/>
-              </a:ext>
-            </a:extLst>
-          </p:cNvPr>
-          <p:cNvSpPr>
-            <a:spLocks noGrp="1"/>
-          </p:cNvSpPr>
-          <p:nvPr>
-            <p:ph idx="1"/>
-          </p:nvPr>
-        </p:nvSpPr>
-        <p:spPr/>
-        <p:txBody>
-          <a:bodyPr/>
-          <a:lstStyle/>
-          <a:p>
-            <a:r>
-              <a:rPr lang="en-AU" dirty="0"/>
-              <a:t>Post</a:t>
-            </a:r>
-          </a:p>
-        </p:txBody>
-      </p:sp>
-    </p:spTree>
-    <p:extLst>
-      <p:ext uri="{BB962C8B-B14F-4D97-AF65-F5344CB8AC3E}">
-        <p14:creationId xmlns:p14="http://schemas.microsoft.com/office/powerpoint/2010/main" val="3079897019"/>
-      </p:ext>
-    </p:extLst>
-  </p:cSld>
-  <p:clrMapOvr>
-    <a:masterClrMapping/>
-  </p:clrMapOvr>
-</p:sld>
-</file>
-
-<file path=ppt/slides/slide8.xml><?xml version="1.0" encoding="utf-8"?>
 <p:sld xmlns:a="http://schemas.openxmlformats.org/drawingml/2006/main" xmlns:r="http://schemas.openxmlformats.org/officeDocument/2006/relationships" xmlns:p="http://schemas.openxmlformats.org/presentationml/2006/main">
   <p:cSld>
     <p:spTree>
@@ -9526,10 +9895,379 @@
           </a:graphicData>
         </a:graphic>
       </p:graphicFrame>
+      <p:sp>
+        <p:nvSpPr>
+          <p:cNvPr id="2" name="TextBox 1">
+            <a:extLst>
+              <a:ext uri="{FF2B5EF4-FFF2-40B4-BE49-F238E27FC236}">
+                <a16:creationId xmlns:a16="http://schemas.microsoft.com/office/drawing/2014/main" id="{3A31C475-D7FF-50B6-5908-4F422D3D4A41}"/>
+              </a:ext>
+            </a:extLst>
+          </p:cNvPr>
+          <p:cNvSpPr txBox="1"/>
+          <p:nvPr/>
+        </p:nvSpPr>
+        <p:spPr>
+          <a:xfrm>
+            <a:off x="466531" y="1329515"/>
+            <a:ext cx="2892490" cy="1754326"/>
+          </a:xfrm>
+          <a:prstGeom prst="rect">
+            <a:avLst/>
+          </a:prstGeom>
+          <a:noFill/>
+        </p:spPr>
+        <p:txBody>
+          <a:bodyPr wrap="square" rtlCol="0">
+            <a:spAutoFit/>
+          </a:bodyPr>
+          <a:lstStyle/>
+          <a:p>
+            <a:r>
+              <a:rPr lang="en-AU" dirty="0"/>
+              <a:t>“map” – map </a:t>
+            </a:r>
+          </a:p>
+          <a:p>
+            <a:r>
+              <a:rPr lang="en-AU" dirty="0"/>
+              <a:t>“fatalities” – fatalities </a:t>
+            </a:r>
+          </a:p>
+          <a:p>
+            <a:r>
+              <a:rPr lang="en-AU" dirty="0"/>
+              <a:t>“speed-limit” –speed limit </a:t>
+            </a:r>
+          </a:p>
+          <a:p>
+            <a:r>
+              <a:rPr lang="en-AU" dirty="0"/>
+              <a:t>“time-of-day” – time of day </a:t>
+            </a:r>
+          </a:p>
+          <a:p>
+            <a:r>
+              <a:rPr lang="en-AU" dirty="0"/>
+              <a:t>“road-users” – road-users</a:t>
+            </a:r>
+          </a:p>
+          <a:p>
+            <a:r>
+              <a:rPr lang="en-AU" dirty="0"/>
+              <a:t>“age-group” – age group </a:t>
+            </a:r>
+          </a:p>
+        </p:txBody>
+      </p:sp>
     </p:spTree>
     <p:extLst>
       <p:ext uri="{BB962C8B-B14F-4D97-AF65-F5344CB8AC3E}">
         <p14:creationId xmlns:p14="http://schemas.microsoft.com/office/powerpoint/2010/main" val="1263692456"/>
+      </p:ext>
+    </p:extLst>
+  </p:cSld>
+  <p:clrMapOvr>
+    <a:masterClrMapping/>
+  </p:clrMapOvr>
+</p:sld>
+</file>
+
+<file path=ppt/slides/slide8.xml><?xml version="1.0" encoding="utf-8"?>
+<p:sld xmlns:a="http://schemas.openxmlformats.org/drawingml/2006/main" xmlns:r="http://schemas.openxmlformats.org/officeDocument/2006/relationships" xmlns:p="http://schemas.openxmlformats.org/presentationml/2006/main">
+  <p:cSld>
+    <p:spTree>
+      <p:nvGrpSpPr>
+        <p:cNvPr id="1" name=""/>
+        <p:cNvGrpSpPr/>
+        <p:nvPr/>
+      </p:nvGrpSpPr>
+      <p:grpSpPr>
+        <a:xfrm>
+          <a:off x="0" y="0"/>
+          <a:ext cx="0" cy="0"/>
+          <a:chOff x="0" y="0"/>
+          <a:chExt cx="0" cy="0"/>
+        </a:xfrm>
+      </p:grpSpPr>
+      <p:sp>
+        <p:nvSpPr>
+          <p:cNvPr id="2" name="Title 1">
+            <a:extLst>
+              <a:ext uri="{FF2B5EF4-FFF2-40B4-BE49-F238E27FC236}">
+                <a16:creationId xmlns:a16="http://schemas.microsoft.com/office/drawing/2014/main" id="{909664FA-57C3-4CCC-E1D0-AC197B1C8AC5}"/>
+              </a:ext>
+            </a:extLst>
+          </p:cNvPr>
+          <p:cNvSpPr>
+            <a:spLocks noGrp="1"/>
+          </p:cNvSpPr>
+          <p:nvPr>
+            <p:ph type="title"/>
+          </p:nvPr>
+        </p:nvSpPr>
+        <p:spPr/>
+        <p:txBody>
+          <a:bodyPr/>
+          <a:lstStyle/>
+          <a:p>
+            <a:endParaRPr lang="en-AU"/>
+          </a:p>
+        </p:txBody>
+      </p:sp>
+      <p:sp>
+        <p:nvSpPr>
+          <p:cNvPr id="3" name="Content Placeholder 2">
+            <a:extLst>
+              <a:ext uri="{FF2B5EF4-FFF2-40B4-BE49-F238E27FC236}">
+                <a16:creationId xmlns:a16="http://schemas.microsoft.com/office/drawing/2014/main" id="{1AEB399C-9527-59F5-7222-A73F77090D13}"/>
+              </a:ext>
+            </a:extLst>
+          </p:cNvPr>
+          <p:cNvSpPr>
+            <a:spLocks noGrp="1"/>
+          </p:cNvSpPr>
+          <p:nvPr>
+            <p:ph idx="1"/>
+          </p:nvPr>
+        </p:nvSpPr>
+        <p:spPr/>
+        <p:txBody>
+          <a:bodyPr/>
+          <a:lstStyle/>
+          <a:p>
+            <a:endParaRPr lang="en-AU"/>
+          </a:p>
+        </p:txBody>
+      </p:sp>
+    </p:spTree>
+    <p:extLst>
+      <p:ext uri="{BB962C8B-B14F-4D97-AF65-F5344CB8AC3E}">
+        <p14:creationId xmlns:p14="http://schemas.microsoft.com/office/powerpoint/2010/main" val="467869864"/>
+      </p:ext>
+    </p:extLst>
+  </p:cSld>
+  <p:clrMapOvr>
+    <a:masterClrMapping/>
+  </p:clrMapOvr>
+</p:sld>
+</file>
+
+<file path=ppt/slides/slide9.xml><?xml version="1.0" encoding="utf-8"?>
+<p:sld xmlns:a="http://schemas.openxmlformats.org/drawingml/2006/main" xmlns:r="http://schemas.openxmlformats.org/officeDocument/2006/relationships" xmlns:p="http://schemas.openxmlformats.org/presentationml/2006/main">
+  <p:cSld>
+    <p:spTree>
+      <p:nvGrpSpPr>
+        <p:cNvPr id="1" name=""/>
+        <p:cNvGrpSpPr/>
+        <p:nvPr/>
+      </p:nvGrpSpPr>
+      <p:grpSpPr>
+        <a:xfrm>
+          <a:off x="0" y="0"/>
+          <a:ext cx="0" cy="0"/>
+          <a:chOff x="0" y="0"/>
+          <a:chExt cx="0" cy="0"/>
+        </a:xfrm>
+      </p:grpSpPr>
+      <p:sp>
+        <p:nvSpPr>
+          <p:cNvPr id="5" name="TextBox 4">
+            <a:extLst>
+              <a:ext uri="{FF2B5EF4-FFF2-40B4-BE49-F238E27FC236}">
+                <a16:creationId xmlns:a16="http://schemas.microsoft.com/office/drawing/2014/main" id="{0AC3B2AA-7EE6-5D55-8FFB-B6D4EE7A69EF}"/>
+              </a:ext>
+            </a:extLst>
+          </p:cNvPr>
+          <p:cNvSpPr txBox="1"/>
+          <p:nvPr/>
+        </p:nvSpPr>
+        <p:spPr>
+          <a:xfrm>
+            <a:off x="335901" y="373225"/>
+            <a:ext cx="11327363" cy="6463308"/>
+          </a:xfrm>
+          <a:prstGeom prst="rect">
+            <a:avLst/>
+          </a:prstGeom>
+          <a:noFill/>
+        </p:spPr>
+        <p:txBody>
+          <a:bodyPr wrap="square">
+            <a:spAutoFit/>
+          </a:bodyPr>
+          <a:lstStyle/>
+          <a:p>
+            <a:r>
+              <a:rPr lang="en-AU" b="1" u="sng" dirty="0"/>
+              <a:t>.index.html – Dashboard / leaflet-html (pending me coding lol) </a:t>
+            </a:r>
+          </a:p>
+          <a:p>
+            <a:r>
+              <a:rPr lang="en-AU" dirty="0"/>
+              <a:t>For creating the HTML, we found a template on W3-School that we worked with. Here we created </a:t>
+            </a:r>
+            <a:r>
+              <a:rPr lang="en-AU" dirty="0" err="1"/>
+              <a:t>divs</a:t>
+            </a:r>
+            <a:r>
+              <a:rPr lang="en-AU" dirty="0"/>
+              <a:t> and blocks to create the containers that we required to place the graphs in. </a:t>
+            </a:r>
+          </a:p>
+          <a:p>
+            <a:r>
+              <a:rPr lang="en-US" dirty="0">
+                <a:hlinkClick r:id="rId2"/>
+              </a:rPr>
+              <a:t>Responsive Web Design Templates (w3schools.com)</a:t>
+            </a:r>
+            <a:r>
+              <a:rPr lang="en-AU" dirty="0"/>
+              <a:t> </a:t>
+            </a:r>
+          </a:p>
+          <a:p>
+            <a:endParaRPr lang="en-AU" dirty="0"/>
+          </a:p>
+          <a:p>
+            <a:r>
+              <a:rPr lang="en-AU" dirty="0"/>
+              <a:t>W3 had also provided us a side bar to work with to include some information about the data source</a:t>
+            </a:r>
+          </a:p>
+          <a:p>
+            <a:r>
+              <a:rPr lang="en-AU" dirty="0"/>
+              <a:t>- About the Project and reasoning of choosing this dashboard </a:t>
+            </a:r>
+          </a:p>
+          <a:p>
+            <a:r>
+              <a:rPr lang="en-AU" dirty="0"/>
+              <a:t>- Data Source- AARD </a:t>
+            </a:r>
+            <a:r>
+              <a:rPr lang="en-AU" dirty="0" err="1"/>
+              <a:t>csvs</a:t>
+            </a:r>
+            <a:r>
+              <a:rPr lang="en-AU" dirty="0"/>
+              <a:t> </a:t>
+            </a:r>
+          </a:p>
+          <a:p>
+            <a:r>
+              <a:rPr lang="en-AU" dirty="0"/>
+              <a:t>- </a:t>
+            </a:r>
+            <a:r>
+              <a:rPr lang="en-AU" dirty="0" err="1"/>
+              <a:t>Leaftlet</a:t>
+            </a:r>
+            <a:r>
+              <a:rPr lang="en-AU" dirty="0"/>
+              <a:t> Index for map presentation of fatalities in Australia </a:t>
+            </a:r>
+          </a:p>
+          <a:p>
+            <a:r>
+              <a:rPr lang="en-AU" dirty="0"/>
+              <a:t>- GitHub repository link</a:t>
+            </a:r>
+          </a:p>
+          <a:p>
+            <a:endParaRPr lang="en-AU" dirty="0"/>
+          </a:p>
+          <a:p>
+            <a:r>
+              <a:rPr lang="en-AU" b="1" u="sng" dirty="0"/>
+              <a:t>In our logic. </a:t>
+            </a:r>
+            <a:r>
+              <a:rPr lang="en-AU" b="1" u="sng" dirty="0" err="1"/>
+              <a:t>js</a:t>
+            </a:r>
+            <a:r>
+              <a:rPr lang="en-AU" b="1" u="sng" dirty="0"/>
+              <a:t> </a:t>
+            </a:r>
+          </a:p>
+          <a:p>
+            <a:r>
+              <a:rPr lang="en-AU" dirty="0"/>
+              <a:t>- Scrolling down with the Div continuing to show as you scroll down the page </a:t>
+            </a:r>
+          </a:p>
+          <a:p>
+            <a:r>
+              <a:rPr lang="en-AU" dirty="0"/>
+              <a:t>- Dropdown box for year selection: </a:t>
+            </a:r>
+          </a:p>
+          <a:p>
+            <a:r>
+              <a:rPr lang="en-AU" dirty="0"/>
+              <a:t>- Functions for creating each chart/table with chart.js </a:t>
+            </a:r>
+            <a:r>
+              <a:rPr lang="en-AU" dirty="0">
+                <a:hlinkClick r:id="rId3"/>
+              </a:rPr>
+              <a:t>Chart.js | Chart.js (chartjs.org)</a:t>
+            </a:r>
+            <a:r>
+              <a:rPr lang="en-AU" dirty="0"/>
+              <a:t> </a:t>
+            </a:r>
+          </a:p>
+          <a:p>
+            <a:r>
+              <a:rPr lang="en-AU" dirty="0"/>
+              <a:t> </a:t>
+            </a:r>
+          </a:p>
+          <a:p>
+            <a:r>
+              <a:rPr lang="en-AU" b="1" u="sng" dirty="0"/>
+              <a:t>styles.css </a:t>
+            </a:r>
+          </a:p>
+          <a:p>
+            <a:r>
+              <a:rPr lang="en-AU" dirty="0"/>
+              <a:t>Styling of tables, fonts, and events for scrolling </a:t>
+            </a:r>
+          </a:p>
+          <a:p>
+            <a:endParaRPr lang="en-AU" dirty="0"/>
+          </a:p>
+          <a:p>
+            <a:r>
+              <a:rPr lang="en-AU" b="1" u="sng" dirty="0"/>
+              <a:t>app.py: (LEE) </a:t>
+            </a:r>
+          </a:p>
+          <a:p>
+            <a:r>
+              <a:rPr lang="en-AU" dirty="0"/>
+              <a:t>Creating pathway through flask to obtain the data from cleaned dataset. </a:t>
+            </a:r>
+          </a:p>
+          <a:p>
+            <a:endParaRPr lang="en-AU" dirty="0"/>
+          </a:p>
+          <a:p>
+            <a:endParaRPr lang="en-AU" dirty="0"/>
+          </a:p>
+        </p:txBody>
+      </p:sp>
+    </p:spTree>
+    <p:extLst>
+      <p:ext uri="{BB962C8B-B14F-4D97-AF65-F5344CB8AC3E}">
+        <p14:creationId xmlns:p14="http://schemas.microsoft.com/office/powerpoint/2010/main" val="2339153136"/>
       </p:ext>
     </p:extLst>
   </p:cSld>

</xml_diff>